<commit_message>
Añadido el reloj. Cambios en la manera de visualizar en el mdoo de configuración del reloj. Modificado el comportamiento del selector
</commit_message>
<xml_diff>
--- a/menus sistema de alarma.pptx
+++ b/menus sistema de alarma.pptx
@@ -9367,7 +9367,7 @@
           <p:nvPr>
             <p:extLst>
               <p:ext uri="{D42A27DB-BD31-4B8C-83A1-F6EECF244321}">
-                <p14:modId xmlns:p14="http://schemas.microsoft.com/office/powerpoint/2010/main" val="2061027109"/>
+                <p14:modId xmlns:p14="http://schemas.microsoft.com/office/powerpoint/2010/main" val="522243311"/>
               </p:ext>
             </p:extLst>
           </p:nvPr>
@@ -9608,34 +9608,55 @@
                     <a:lstStyle/>
                     <a:p>
                       <a:pPr algn="ctr"/>
-                      <a:endParaRPr lang="es-PR" sz="2000" dirty="0">
-                        <a:latin typeface="Courier New" panose="02070309020205020404" pitchFamily="49" charset="0"/>
-                        <a:cs typeface="Courier New" panose="02070309020205020404" pitchFamily="49" charset="0"/>
-                      </a:endParaRPr>
-                    </a:p>
-                  </a:txBody>
-                  <a:tcPr anchor="ctr"/>
-                </a:tc>
-                <a:tc>
-                  <a:txBody>
-                    <a:bodyPr/>
-                    <a:lstStyle/>
-                    <a:p>
-                      <a:pPr algn="ctr"/>
-                      <a:endParaRPr lang="es-PR" sz="2000" dirty="0">
-                        <a:latin typeface="Courier New" panose="02070309020205020404" pitchFamily="49" charset="0"/>
-                        <a:cs typeface="Courier New" panose="02070309020205020404" pitchFamily="49" charset="0"/>
-                      </a:endParaRPr>
-                    </a:p>
-                  </a:txBody>
-                  <a:tcPr anchor="ctr"/>
-                </a:tc>
-                <a:tc>
-                  <a:txBody>
-                    <a:bodyPr/>
-                    <a:lstStyle/>
-                    <a:p>
-                      <a:pPr algn="ctr"/>
+                      <a:r>
+                        <a:rPr lang="es-ES" sz="2000" dirty="0">
+                          <a:latin typeface="Courier New" panose="02070309020205020404" pitchFamily="49" charset="0"/>
+                          <a:cs typeface="Courier New" panose="02070309020205020404" pitchFamily="49" charset="0"/>
+                        </a:rPr>
+                        <a:t>:</a:t>
+                      </a:r>
+                      <a:endParaRPr lang="es-PR" sz="2000" dirty="0">
+                        <a:latin typeface="Courier New" panose="02070309020205020404" pitchFamily="49" charset="0"/>
+                        <a:cs typeface="Courier New" panose="02070309020205020404" pitchFamily="49" charset="0"/>
+                      </a:endParaRPr>
+                    </a:p>
+                  </a:txBody>
+                  <a:tcPr anchor="ctr"/>
+                </a:tc>
+                <a:tc>
+                  <a:txBody>
+                    <a:bodyPr/>
+                    <a:lstStyle/>
+                    <a:p>
+                      <a:pPr algn="ctr"/>
+                      <a:r>
+                        <a:rPr lang="es-ES" sz="2000" dirty="0">
+                          <a:latin typeface="Courier New" panose="02070309020205020404" pitchFamily="49" charset="0"/>
+                          <a:cs typeface="Courier New" panose="02070309020205020404" pitchFamily="49" charset="0"/>
+                        </a:rPr>
+                        <a:t>s</a:t>
+                      </a:r>
+                      <a:endParaRPr lang="es-PR" sz="2000" dirty="0">
+                        <a:latin typeface="Courier New" panose="02070309020205020404" pitchFamily="49" charset="0"/>
+                        <a:cs typeface="Courier New" panose="02070309020205020404" pitchFamily="49" charset="0"/>
+                      </a:endParaRPr>
+                    </a:p>
+                  </a:txBody>
+                  <a:tcPr anchor="ctr"/>
+                </a:tc>
+                <a:tc>
+                  <a:txBody>
+                    <a:bodyPr/>
+                    <a:lstStyle/>
+                    <a:p>
+                      <a:pPr algn="ctr"/>
+                      <a:r>
+                        <a:rPr lang="es-ES" sz="2000">
+                          <a:latin typeface="Courier New" panose="02070309020205020404" pitchFamily="49" charset="0"/>
+                          <a:cs typeface="Courier New" panose="02070309020205020404" pitchFamily="49" charset="0"/>
+                        </a:rPr>
+                        <a:t>s</a:t>
+                      </a:r>
                       <a:endParaRPr lang="es-PR" sz="2000" dirty="0">
                         <a:latin typeface="Courier New" panose="02070309020205020404" pitchFamily="49" charset="0"/>
                         <a:cs typeface="Courier New" panose="02070309020205020404" pitchFamily="49" charset="0"/>

</xml_diff>

<commit_message>
Cambiado el idioma de los menús. Cambios en la disposición de opciones en algunos menús
</commit_message>
<xml_diff>
--- a/menus sistema de alarma.pptx
+++ b/menus sistema de alarma.pptx
@@ -6268,7 +6268,7 @@
           <a:p>
             <a:fld id="{A9D4DB31-6CEA-4AFD-B401-5A3C6C72258E}" type="datetimeFigureOut">
               <a:rPr lang="es-PR" smtClean="0"/>
-              <a:t>12/27/2022</a:t>
+              <a:t>12/28/2022</a:t>
             </a:fld>
             <a:endParaRPr lang="es-PR" dirty="0"/>
           </a:p>
@@ -6468,7 +6468,7 @@
           <a:p>
             <a:fld id="{A9D4DB31-6CEA-4AFD-B401-5A3C6C72258E}" type="datetimeFigureOut">
               <a:rPr lang="es-PR" smtClean="0"/>
-              <a:t>12/27/2022</a:t>
+              <a:t>12/28/2022</a:t>
             </a:fld>
             <a:endParaRPr lang="es-PR" dirty="0"/>
           </a:p>
@@ -6678,7 +6678,7 @@
           <a:p>
             <a:fld id="{A9D4DB31-6CEA-4AFD-B401-5A3C6C72258E}" type="datetimeFigureOut">
               <a:rPr lang="es-PR" smtClean="0"/>
-              <a:t>12/27/2022</a:t>
+              <a:t>12/28/2022</a:t>
             </a:fld>
             <a:endParaRPr lang="es-PR" dirty="0"/>
           </a:p>
@@ -6878,7 +6878,7 @@
           <a:p>
             <a:fld id="{A9D4DB31-6CEA-4AFD-B401-5A3C6C72258E}" type="datetimeFigureOut">
               <a:rPr lang="es-PR" smtClean="0"/>
-              <a:t>12/27/2022</a:t>
+              <a:t>12/28/2022</a:t>
             </a:fld>
             <a:endParaRPr lang="es-PR" dirty="0"/>
           </a:p>
@@ -7154,7 +7154,7 @@
           <a:p>
             <a:fld id="{A9D4DB31-6CEA-4AFD-B401-5A3C6C72258E}" type="datetimeFigureOut">
               <a:rPr lang="es-PR" smtClean="0"/>
-              <a:t>12/27/2022</a:t>
+              <a:t>12/28/2022</a:t>
             </a:fld>
             <a:endParaRPr lang="es-PR" dirty="0"/>
           </a:p>
@@ -7422,7 +7422,7 @@
           <a:p>
             <a:fld id="{A9D4DB31-6CEA-4AFD-B401-5A3C6C72258E}" type="datetimeFigureOut">
               <a:rPr lang="es-PR" smtClean="0"/>
-              <a:t>12/27/2022</a:t>
+              <a:t>12/28/2022</a:t>
             </a:fld>
             <a:endParaRPr lang="es-PR" dirty="0"/>
           </a:p>
@@ -7837,7 +7837,7 @@
           <a:p>
             <a:fld id="{A9D4DB31-6CEA-4AFD-B401-5A3C6C72258E}" type="datetimeFigureOut">
               <a:rPr lang="es-PR" smtClean="0"/>
-              <a:t>12/27/2022</a:t>
+              <a:t>12/28/2022</a:t>
             </a:fld>
             <a:endParaRPr lang="es-PR" dirty="0"/>
           </a:p>
@@ -7979,7 +7979,7 @@
           <a:p>
             <a:fld id="{A9D4DB31-6CEA-4AFD-B401-5A3C6C72258E}" type="datetimeFigureOut">
               <a:rPr lang="es-PR" smtClean="0"/>
-              <a:t>12/27/2022</a:t>
+              <a:t>12/28/2022</a:t>
             </a:fld>
             <a:endParaRPr lang="es-PR" dirty="0"/>
           </a:p>
@@ -8092,7 +8092,7 @@
           <a:p>
             <a:fld id="{A9D4DB31-6CEA-4AFD-B401-5A3C6C72258E}" type="datetimeFigureOut">
               <a:rPr lang="es-PR" smtClean="0"/>
-              <a:t>12/27/2022</a:t>
+              <a:t>12/28/2022</a:t>
             </a:fld>
             <a:endParaRPr lang="es-PR" dirty="0"/>
           </a:p>
@@ -8405,7 +8405,7 @@
           <a:p>
             <a:fld id="{A9D4DB31-6CEA-4AFD-B401-5A3C6C72258E}" type="datetimeFigureOut">
               <a:rPr lang="es-PR" smtClean="0"/>
-              <a:t>12/27/2022</a:t>
+              <a:t>12/28/2022</a:t>
             </a:fld>
             <a:endParaRPr lang="es-PR" dirty="0"/>
           </a:p>
@@ -8694,7 +8694,7 @@
           <a:p>
             <a:fld id="{A9D4DB31-6CEA-4AFD-B401-5A3C6C72258E}" type="datetimeFigureOut">
               <a:rPr lang="es-PR" smtClean="0"/>
-              <a:t>12/27/2022</a:t>
+              <a:t>12/28/2022</a:t>
             </a:fld>
             <a:endParaRPr lang="es-PR" dirty="0"/>
           </a:p>
@@ -8937,7 +8937,7 @@
           <a:p>
             <a:fld id="{A9D4DB31-6CEA-4AFD-B401-5A3C6C72258E}" type="datetimeFigureOut">
               <a:rPr lang="es-PR" smtClean="0"/>
-              <a:t>12/27/2022</a:t>
+              <a:t>12/28/2022</a:t>
             </a:fld>
             <a:endParaRPr lang="es-PR" dirty="0"/>
           </a:p>
@@ -10294,7 +10294,7 @@
           <p:nvPr>
             <p:extLst>
               <p:ext uri="{D42A27DB-BD31-4B8C-83A1-F6EECF244321}">
-                <p14:modId xmlns:p14="http://schemas.microsoft.com/office/powerpoint/2010/main" val="3267896588"/>
+                <p14:modId xmlns:p14="http://schemas.microsoft.com/office/powerpoint/2010/main" val="3015947078"/>
               </p:ext>
             </p:extLst>
           </p:nvPr>
@@ -10456,7 +10456,91 @@
                           <a:latin typeface="Courier New" panose="02070309020205020404" pitchFamily="49" charset="0"/>
                           <a:cs typeface="Courier New" panose="02070309020205020404" pitchFamily="49" charset="0"/>
                         </a:rPr>
-                        <a:t>E</a:t>
+                        <a:t>P</a:t>
+                      </a:r>
+                      <a:endParaRPr lang="es-PR" sz="2000" dirty="0">
+                        <a:latin typeface="Courier New" panose="02070309020205020404" pitchFamily="49" charset="0"/>
+                        <a:cs typeface="Courier New" panose="02070309020205020404" pitchFamily="49" charset="0"/>
+                      </a:endParaRPr>
+                    </a:p>
+                  </a:txBody>
+                  <a:tcPr anchor="ctr"/>
+                </a:tc>
+                <a:tc>
+                  <a:txBody>
+                    <a:bodyPr/>
+                    <a:lstStyle/>
+                    <a:p>
+                      <a:pPr algn="ctr"/>
+                      <a:r>
+                        <a:rPr lang="es-ES" sz="2000" dirty="0">
+                          <a:latin typeface="Courier New" panose="02070309020205020404" pitchFamily="49" charset="0"/>
+                          <a:cs typeface="Courier New" panose="02070309020205020404" pitchFamily="49" charset="0"/>
+                        </a:rPr>
+                        <a:t>r</a:t>
+                      </a:r>
+                      <a:endParaRPr lang="es-PR" sz="2000" dirty="0">
+                        <a:latin typeface="Courier New" panose="02070309020205020404" pitchFamily="49" charset="0"/>
+                        <a:cs typeface="Courier New" panose="02070309020205020404" pitchFamily="49" charset="0"/>
+                      </a:endParaRPr>
+                    </a:p>
+                  </a:txBody>
+                  <a:tcPr anchor="ctr"/>
+                </a:tc>
+                <a:tc>
+                  <a:txBody>
+                    <a:bodyPr/>
+                    <a:lstStyle/>
+                    <a:p>
+                      <a:pPr algn="ctr"/>
+                      <a:r>
+                        <a:rPr lang="es-ES" sz="2000" dirty="0">
+                          <a:latin typeface="Courier New" panose="02070309020205020404" pitchFamily="49" charset="0"/>
+                          <a:cs typeface="Courier New" panose="02070309020205020404" pitchFamily="49" charset="0"/>
+                        </a:rPr>
+                        <a:t>e</a:t>
+                      </a:r>
+                      <a:endParaRPr lang="es-PR" sz="2000" dirty="0">
+                        <a:latin typeface="Courier New" panose="02070309020205020404" pitchFamily="49" charset="0"/>
+                        <a:cs typeface="Courier New" panose="02070309020205020404" pitchFamily="49" charset="0"/>
+                      </a:endParaRPr>
+                    </a:p>
+                  </a:txBody>
+                  <a:tcPr anchor="ctr"/>
+                </a:tc>
+                <a:tc>
+                  <a:txBody>
+                    <a:bodyPr/>
+                    <a:lstStyle/>
+                    <a:p>
+                      <a:pPr algn="ctr"/>
+                      <a:r>
+                        <a:rPr lang="es-ES" sz="2000" dirty="0">
+                          <a:latin typeface="Courier New" panose="02070309020205020404" pitchFamily="49" charset="0"/>
+                          <a:cs typeface="Courier New" panose="02070309020205020404" pitchFamily="49" charset="0"/>
+                        </a:rPr>
+                        <a:t>s</a:t>
+                      </a:r>
+                      <a:endParaRPr lang="es-PR" sz="2000" dirty="0">
+                        <a:latin typeface="Courier New" panose="02070309020205020404" pitchFamily="49" charset="0"/>
+                        <a:cs typeface="Courier New" panose="02070309020205020404" pitchFamily="49" charset="0"/>
+                      </a:endParaRPr>
+                    </a:p>
+                  </a:txBody>
+                  <a:tcPr anchor="ctr"/>
+                </a:tc>
+                <a:tc>
+                  <a:txBody>
+                    <a:bodyPr/>
+                    <a:lstStyle/>
+                    <a:p>
+                      <a:pPr algn="ctr"/>
+                      <a:r>
+                        <a:rPr lang="es-ES" sz="2000" dirty="0">
+                          <a:latin typeface="Courier New" panose="02070309020205020404" pitchFamily="49" charset="0"/>
+                          <a:cs typeface="Courier New" panose="02070309020205020404" pitchFamily="49" charset="0"/>
+                        </a:rPr>
+                        <a:t>e</a:t>
                       </a:r>
                       <a:endParaRPr lang="es-PR" sz="2000" dirty="0">
                         <a:latin typeface="Courier New" panose="02070309020205020404" pitchFamily="49" charset="0"/>
@@ -10478,90 +10562,6 @@
                           <a:cs typeface="Courier New" panose="02070309020205020404" pitchFamily="49" charset="0"/>
                         </a:rPr>
                         <a:t>n</a:t>
-                      </a:r>
-                      <a:endParaRPr lang="es-PR" sz="2000" dirty="0">
-                        <a:latin typeface="Courier New" panose="02070309020205020404" pitchFamily="49" charset="0"/>
-                        <a:cs typeface="Courier New" panose="02070309020205020404" pitchFamily="49" charset="0"/>
-                      </a:endParaRPr>
-                    </a:p>
-                  </a:txBody>
-                  <a:tcPr anchor="ctr"/>
-                </a:tc>
-                <a:tc>
-                  <a:txBody>
-                    <a:bodyPr/>
-                    <a:lstStyle/>
-                    <a:p>
-                      <a:pPr algn="ctr"/>
-                      <a:r>
-                        <a:rPr lang="es-ES" sz="2000" dirty="0">
-                          <a:latin typeface="Courier New" panose="02070309020205020404" pitchFamily="49" charset="0"/>
-                          <a:cs typeface="Courier New" panose="02070309020205020404" pitchFamily="49" charset="0"/>
-                        </a:rPr>
-                        <a:t>a</a:t>
-                      </a:r>
-                      <a:endParaRPr lang="es-PR" sz="2000" dirty="0">
-                        <a:latin typeface="Courier New" panose="02070309020205020404" pitchFamily="49" charset="0"/>
-                        <a:cs typeface="Courier New" panose="02070309020205020404" pitchFamily="49" charset="0"/>
-                      </a:endParaRPr>
-                    </a:p>
-                  </a:txBody>
-                  <a:tcPr anchor="ctr"/>
-                </a:tc>
-                <a:tc>
-                  <a:txBody>
-                    <a:bodyPr/>
-                    <a:lstStyle/>
-                    <a:p>
-                      <a:pPr algn="ctr"/>
-                      <a:r>
-                        <a:rPr lang="es-ES" sz="2000" dirty="0">
-                          <a:latin typeface="Courier New" panose="02070309020205020404" pitchFamily="49" charset="0"/>
-                          <a:cs typeface="Courier New" panose="02070309020205020404" pitchFamily="49" charset="0"/>
-                        </a:rPr>
-                        <a:t>b</a:t>
-                      </a:r>
-                      <a:endParaRPr lang="es-PR" sz="2000" dirty="0">
-                        <a:latin typeface="Courier New" panose="02070309020205020404" pitchFamily="49" charset="0"/>
-                        <a:cs typeface="Courier New" panose="02070309020205020404" pitchFamily="49" charset="0"/>
-                      </a:endParaRPr>
-                    </a:p>
-                  </a:txBody>
-                  <a:tcPr anchor="ctr"/>
-                </a:tc>
-                <a:tc>
-                  <a:txBody>
-                    <a:bodyPr/>
-                    <a:lstStyle/>
-                    <a:p>
-                      <a:pPr algn="ctr"/>
-                      <a:r>
-                        <a:rPr lang="es-ES" sz="2000" dirty="0">
-                          <a:latin typeface="Courier New" panose="02070309020205020404" pitchFamily="49" charset="0"/>
-                          <a:cs typeface="Courier New" panose="02070309020205020404" pitchFamily="49" charset="0"/>
-                        </a:rPr>
-                        <a:t>l</a:t>
-                      </a:r>
-                      <a:endParaRPr lang="es-PR" sz="2000" dirty="0">
-                        <a:latin typeface="Courier New" panose="02070309020205020404" pitchFamily="49" charset="0"/>
-                        <a:cs typeface="Courier New" panose="02070309020205020404" pitchFamily="49" charset="0"/>
-                      </a:endParaRPr>
-                    </a:p>
-                  </a:txBody>
-                  <a:tcPr anchor="ctr"/>
-                </a:tc>
-                <a:tc>
-                  <a:txBody>
-                    <a:bodyPr/>
-                    <a:lstStyle/>
-                    <a:p>
-                      <a:pPr algn="ctr"/>
-                      <a:r>
-                        <a:rPr lang="es-ES" sz="2000" dirty="0">
-                          <a:latin typeface="Courier New" panose="02070309020205020404" pitchFamily="49" charset="0"/>
-                          <a:cs typeface="Courier New" panose="02070309020205020404" pitchFamily="49" charset="0"/>
-                        </a:rPr>
-                        <a:t>e</a:t>
                       </a:r>
                       <a:endParaRPr lang="es-PR" sz="2000" dirty="0">
                         <a:latin typeface="Courier New" panose="02070309020205020404" pitchFamily="49" charset="0"/>
@@ -10595,10 +10595,115 @@
                       </a:pPr>
                       <a:r>
                         <a:rPr lang="es-ES" sz="2000" dirty="0">
+                          <a:latin typeface="Webdings" panose="05030102010509060703" pitchFamily="18" charset="2"/>
+                          <a:cs typeface="Courier New" panose="02070309020205020404" pitchFamily="49" charset="0"/>
+                        </a:rPr>
+                        <a:t>a</a:t>
+                      </a:r>
+                      <a:endParaRPr lang="es-PR" sz="2000" dirty="0">
+                        <a:latin typeface="Courier New" panose="02070309020205020404" pitchFamily="49" charset="0"/>
+                        <a:cs typeface="Courier New" panose="02070309020205020404" pitchFamily="49" charset="0"/>
+                      </a:endParaRPr>
+                    </a:p>
+                  </a:txBody>
+                  <a:tcPr anchor="ctr"/>
+                </a:tc>
+                <a:tc>
+                  <a:txBody>
+                    <a:bodyPr/>
+                    <a:lstStyle/>
+                    <a:p>
+                      <a:pPr algn="ctr"/>
+                      <a:r>
+                        <a:rPr lang="es-ES" sz="2000" dirty="0">
                           <a:latin typeface="Courier New" panose="02070309020205020404" pitchFamily="49" charset="0"/>
                           <a:cs typeface="Courier New" panose="02070309020205020404" pitchFamily="49" charset="0"/>
                         </a:rPr>
-                        <a:t>d</a:t>
+                        <a:t>&gt;</a:t>
+                      </a:r>
+                      <a:endParaRPr lang="es-PR" sz="2000" dirty="0">
+                        <a:latin typeface="Courier New" panose="02070309020205020404" pitchFamily="49" charset="0"/>
+                        <a:cs typeface="Courier New" panose="02070309020205020404" pitchFamily="49" charset="0"/>
+                      </a:endParaRPr>
+                    </a:p>
+                  </a:txBody>
+                  <a:tcPr anchor="ctr"/>
+                </a:tc>
+                <a:tc>
+                  <a:txBody>
+                    <a:bodyPr/>
+                    <a:lstStyle/>
+                    <a:p>
+                      <a:pPr algn="ctr"/>
+                      <a:r>
+                        <a:rPr lang="es-ES" sz="2000" dirty="0">
+                          <a:latin typeface="Courier New" panose="02070309020205020404" pitchFamily="49" charset="0"/>
+                          <a:cs typeface="Courier New" panose="02070309020205020404" pitchFamily="49" charset="0"/>
+                        </a:rPr>
+                        <a:t>F</a:t>
+                      </a:r>
+                      <a:endParaRPr lang="es-PR" sz="2000" dirty="0">
+                        <a:latin typeface="Courier New" panose="02070309020205020404" pitchFamily="49" charset="0"/>
+                        <a:cs typeface="Courier New" panose="02070309020205020404" pitchFamily="49" charset="0"/>
+                      </a:endParaRPr>
+                    </a:p>
+                  </a:txBody>
+                  <a:tcPr anchor="ctr"/>
+                </a:tc>
+                <a:tc>
+                  <a:txBody>
+                    <a:bodyPr/>
+                    <a:lstStyle/>
+                    <a:p>
+                      <a:pPr algn="ctr"/>
+                      <a:r>
+                        <a:rPr lang="es-ES" sz="2000" dirty="0">
+                          <a:latin typeface="Courier New" panose="02070309020205020404" pitchFamily="49" charset="0"/>
+                          <a:cs typeface="Courier New" panose="02070309020205020404" pitchFamily="49" charset="0"/>
+                        </a:rPr>
+                        <a:t>i</a:t>
+                      </a:r>
+                      <a:endParaRPr lang="es-PR" sz="2000" dirty="0">
+                        <a:latin typeface="Courier New" panose="02070309020205020404" pitchFamily="49" charset="0"/>
+                        <a:cs typeface="Courier New" panose="02070309020205020404" pitchFamily="49" charset="0"/>
+                      </a:endParaRPr>
+                    </a:p>
+                  </a:txBody>
+                  <a:tcPr anchor="ctr"/>
+                </a:tc>
+                <a:tc>
+                  <a:txBody>
+                    <a:bodyPr/>
+                    <a:lstStyle/>
+                    <a:p>
+                      <a:pPr algn="ctr"/>
+                      <a:r>
+                        <a:rPr lang="es-ES" sz="2000" dirty="0">
+                          <a:latin typeface="Courier New" panose="02070309020205020404" pitchFamily="49" charset="0"/>
+                          <a:cs typeface="Courier New" panose="02070309020205020404" pitchFamily="49" charset="0"/>
+                        </a:rPr>
+                        <a:t>r</a:t>
+                      </a:r>
+                      <a:endParaRPr lang="es-PR" sz="2000" dirty="0">
+                        <a:latin typeface="Courier New" panose="02070309020205020404" pitchFamily="49" charset="0"/>
+                        <a:cs typeface="Courier New" panose="02070309020205020404" pitchFamily="49" charset="0"/>
+                      </a:endParaRPr>
+                    </a:p>
+                  </a:txBody>
+                  <a:tcPr anchor="ctr"/>
+                </a:tc>
+                <a:tc>
+                  <a:txBody>
+                    <a:bodyPr/>
+                    <a:lstStyle/>
+                    <a:p>
+                      <a:pPr algn="ctr"/>
+                      <a:r>
+                        <a:rPr lang="es-ES" sz="2000" dirty="0">
+                          <a:latin typeface="Courier New" panose="02070309020205020404" pitchFamily="49" charset="0"/>
+                          <a:cs typeface="Courier New" panose="02070309020205020404" pitchFamily="49" charset="0"/>
+                        </a:rPr>
+                        <a:t>e</a:t>
                       </a:r>
                       <a:endParaRPr lang="es-PR" sz="2000" dirty="0">
                         <a:latin typeface="Courier New" panose="02070309020205020404" pitchFamily="49" charset="0"/>
@@ -10638,7 +10743,21 @@
                         <a:t>a</a:t>
                       </a:r>
                       <a:endParaRPr lang="es-PR" sz="2000" dirty="0">
-                        <a:latin typeface="Webdings" panose="05030102010509060703" pitchFamily="18" charset="2"/>
+                        <a:latin typeface="Courier New" panose="02070309020205020404" pitchFamily="49" charset="0"/>
+                        <a:cs typeface="Courier New" panose="02070309020205020404" pitchFamily="49" charset="0"/>
+                      </a:endParaRPr>
+                    </a:p>
+                  </a:txBody>
+                  <a:tcPr anchor="ctr"/>
+                </a:tc>
+                <a:tc>
+                  <a:txBody>
+                    <a:bodyPr/>
+                    <a:lstStyle/>
+                    <a:p>
+                      <a:pPr algn="ctr"/>
+                      <a:endParaRPr lang="es-PR" sz="2000" dirty="0">
+                        <a:latin typeface="Courier New" panose="02070309020205020404" pitchFamily="49" charset="0"/>
                         <a:cs typeface="Courier New" panose="02070309020205020404" pitchFamily="49" charset="0"/>
                       </a:endParaRPr>
                     </a:p>
@@ -10668,13 +10787,20 @@
                         <a:defRPr/>
                       </a:pPr>
                       <a:endParaRPr lang="es-PR" sz="2000" dirty="0">
-                        <a:latin typeface="Webdings" panose="05030102010509060703" pitchFamily="18" charset="2"/>
-                        <a:cs typeface="Courier New" panose="02070309020205020404" pitchFamily="49" charset="0"/>
-                      </a:endParaRPr>
-                    </a:p>
-                  </a:txBody>
-                  <a:tcPr anchor="ctr"/>
-                </a:tc>
+                        <a:latin typeface="Courier New" panose="02070309020205020404" pitchFamily="49" charset="0"/>
+                        <a:cs typeface="Courier New" panose="02070309020205020404" pitchFamily="49" charset="0"/>
+                      </a:endParaRPr>
+                    </a:p>
+                  </a:txBody>
+                  <a:tcPr anchor="ctr"/>
+                </a:tc>
+                <a:extLst>
+                  <a:ext uri="{0D108BD9-81ED-4DB2-BD59-A6C34878D82A}">
+                    <a16:rowId xmlns:a16="http://schemas.microsoft.com/office/drawing/2014/main" val="2506798063"/>
+                  </a:ext>
+                </a:extLst>
+              </a:tr>
+              <a:tr h="715205">
                 <a:tc>
                   <a:txBody>
                     <a:bodyPr/>
@@ -10707,7 +10833,7 @@
                           <a:latin typeface="Courier New" panose="02070309020205020404" pitchFamily="49" charset="0"/>
                           <a:cs typeface="Courier New" panose="02070309020205020404" pitchFamily="49" charset="0"/>
                         </a:rPr>
-                        <a:t>F</a:t>
+                        <a:t>E</a:t>
                       </a:r>
                       <a:endParaRPr lang="es-PR" sz="2000" dirty="0">
                         <a:latin typeface="Courier New" panose="02070309020205020404" pitchFamily="49" charset="0"/>
@@ -10728,7 +10854,7 @@
                           <a:latin typeface="Courier New" panose="02070309020205020404" pitchFamily="49" charset="0"/>
                           <a:cs typeface="Courier New" panose="02070309020205020404" pitchFamily="49" charset="0"/>
                         </a:rPr>
-                        <a:t>i</a:t>
+                        <a:t>n</a:t>
                       </a:r>
                       <a:endParaRPr lang="es-PR" sz="2000" dirty="0">
                         <a:latin typeface="Courier New" panose="02070309020205020404" pitchFamily="49" charset="0"/>
@@ -10749,7 +10875,49 @@
                           <a:latin typeface="Courier New" panose="02070309020205020404" pitchFamily="49" charset="0"/>
                           <a:cs typeface="Courier New" panose="02070309020205020404" pitchFamily="49" charset="0"/>
                         </a:rPr>
-                        <a:t>r</a:t>
+                        <a:t>a</a:t>
+                      </a:r>
+                      <a:endParaRPr lang="es-PR" sz="2000" dirty="0">
+                        <a:latin typeface="Courier New" panose="02070309020205020404" pitchFamily="49" charset="0"/>
+                        <a:cs typeface="Courier New" panose="02070309020205020404" pitchFamily="49" charset="0"/>
+                      </a:endParaRPr>
+                    </a:p>
+                  </a:txBody>
+                  <a:tcPr anchor="ctr"/>
+                </a:tc>
+                <a:tc>
+                  <a:txBody>
+                    <a:bodyPr/>
+                    <a:lstStyle/>
+                    <a:p>
+                      <a:pPr algn="ctr"/>
+                      <a:r>
+                        <a:rPr lang="es-ES" sz="2000" dirty="0">
+                          <a:latin typeface="Courier New" panose="02070309020205020404" pitchFamily="49" charset="0"/>
+                          <a:cs typeface="Courier New" panose="02070309020205020404" pitchFamily="49" charset="0"/>
+                        </a:rPr>
+                        <a:t>b</a:t>
+                      </a:r>
+                      <a:endParaRPr lang="es-PR" sz="2000" dirty="0">
+                        <a:latin typeface="Courier New" panose="02070309020205020404" pitchFamily="49" charset="0"/>
+                        <a:cs typeface="Courier New" panose="02070309020205020404" pitchFamily="49" charset="0"/>
+                      </a:endParaRPr>
+                    </a:p>
+                  </a:txBody>
+                  <a:tcPr anchor="ctr"/>
+                </a:tc>
+                <a:tc>
+                  <a:txBody>
+                    <a:bodyPr/>
+                    <a:lstStyle/>
+                    <a:p>
+                      <a:pPr algn="ctr"/>
+                      <a:r>
+                        <a:rPr lang="es-ES" sz="2000" dirty="0">
+                          <a:latin typeface="Courier New" panose="02070309020205020404" pitchFamily="49" charset="0"/>
+                          <a:cs typeface="Courier New" panose="02070309020205020404" pitchFamily="49" charset="0"/>
+                        </a:rPr>
+                        <a:t>l</a:t>
                       </a:r>
                       <a:endParaRPr lang="es-PR" sz="2000" dirty="0">
                         <a:latin typeface="Courier New" panose="02070309020205020404" pitchFamily="49" charset="0"/>
@@ -10817,181 +10985,6 @@
                   </a:txBody>
                   <a:tcPr anchor="ctr"/>
                 </a:tc>
-                <a:extLst>
-                  <a:ext uri="{0D108BD9-81ED-4DB2-BD59-A6C34878D82A}">
-                    <a16:rowId xmlns:a16="http://schemas.microsoft.com/office/drawing/2014/main" val="2506798063"/>
-                  </a:ext>
-                </a:extLst>
-              </a:tr>
-              <a:tr h="715205">
-                <a:tc>
-                  <a:txBody>
-                    <a:bodyPr/>
-                    <a:lstStyle/>
-                    <a:p>
-                      <a:pPr algn="ctr"/>
-                      <a:r>
-                        <a:rPr lang="es-ES" sz="2000" dirty="0">
-                          <a:latin typeface="Courier New" panose="02070309020205020404" pitchFamily="49" charset="0"/>
-                          <a:cs typeface="Courier New" panose="02070309020205020404" pitchFamily="49" charset="0"/>
-                        </a:rPr>
-                        <a:t>&gt;</a:t>
-                      </a:r>
-                      <a:endParaRPr lang="es-PR" sz="2000" dirty="0">
-                        <a:latin typeface="Courier New" panose="02070309020205020404" pitchFamily="49" charset="0"/>
-                        <a:cs typeface="Courier New" panose="02070309020205020404" pitchFamily="49" charset="0"/>
-                      </a:endParaRPr>
-                    </a:p>
-                  </a:txBody>
-                  <a:tcPr anchor="ctr"/>
-                </a:tc>
-                <a:tc>
-                  <a:txBody>
-                    <a:bodyPr/>
-                    <a:lstStyle/>
-                    <a:p>
-                      <a:pPr algn="ctr"/>
-                      <a:r>
-                        <a:rPr lang="es-ES" sz="2000" dirty="0">
-                          <a:latin typeface="Courier New" panose="02070309020205020404" pitchFamily="49" charset="0"/>
-                          <a:cs typeface="Courier New" panose="02070309020205020404" pitchFamily="49" charset="0"/>
-                        </a:rPr>
-                        <a:t>P</a:t>
-                      </a:r>
-                      <a:endParaRPr lang="es-PR" sz="2000" dirty="0">
-                        <a:latin typeface="Courier New" panose="02070309020205020404" pitchFamily="49" charset="0"/>
-                        <a:cs typeface="Courier New" panose="02070309020205020404" pitchFamily="49" charset="0"/>
-                      </a:endParaRPr>
-                    </a:p>
-                  </a:txBody>
-                  <a:tcPr anchor="ctr"/>
-                </a:tc>
-                <a:tc>
-                  <a:txBody>
-                    <a:bodyPr/>
-                    <a:lstStyle/>
-                    <a:p>
-                      <a:pPr algn="ctr"/>
-                      <a:r>
-                        <a:rPr lang="es-ES" sz="2000" dirty="0">
-                          <a:latin typeface="Courier New" panose="02070309020205020404" pitchFamily="49" charset="0"/>
-                          <a:cs typeface="Courier New" panose="02070309020205020404" pitchFamily="49" charset="0"/>
-                        </a:rPr>
-                        <a:t>r</a:t>
-                      </a:r>
-                      <a:endParaRPr lang="es-PR" sz="2000" dirty="0">
-                        <a:latin typeface="Courier New" panose="02070309020205020404" pitchFamily="49" charset="0"/>
-                        <a:cs typeface="Courier New" panose="02070309020205020404" pitchFamily="49" charset="0"/>
-                      </a:endParaRPr>
-                    </a:p>
-                  </a:txBody>
-                  <a:tcPr anchor="ctr"/>
-                </a:tc>
-                <a:tc>
-                  <a:txBody>
-                    <a:bodyPr/>
-                    <a:lstStyle/>
-                    <a:p>
-                      <a:pPr algn="ctr"/>
-                      <a:r>
-                        <a:rPr lang="es-ES" sz="2000" dirty="0">
-                          <a:latin typeface="Courier New" panose="02070309020205020404" pitchFamily="49" charset="0"/>
-                          <a:cs typeface="Courier New" panose="02070309020205020404" pitchFamily="49" charset="0"/>
-                        </a:rPr>
-                        <a:t>e</a:t>
-                      </a:r>
-                      <a:endParaRPr lang="es-PR" sz="2000" dirty="0">
-                        <a:latin typeface="Courier New" panose="02070309020205020404" pitchFamily="49" charset="0"/>
-                        <a:cs typeface="Courier New" panose="02070309020205020404" pitchFamily="49" charset="0"/>
-                      </a:endParaRPr>
-                    </a:p>
-                  </a:txBody>
-                  <a:tcPr anchor="ctr"/>
-                </a:tc>
-                <a:tc>
-                  <a:txBody>
-                    <a:bodyPr/>
-                    <a:lstStyle/>
-                    <a:p>
-                      <a:pPr algn="ctr"/>
-                      <a:r>
-                        <a:rPr lang="es-ES" sz="2000" dirty="0">
-                          <a:latin typeface="Courier New" panose="02070309020205020404" pitchFamily="49" charset="0"/>
-                          <a:cs typeface="Courier New" panose="02070309020205020404" pitchFamily="49" charset="0"/>
-                        </a:rPr>
-                        <a:t>s</a:t>
-                      </a:r>
-                      <a:endParaRPr lang="es-PR" sz="2000" dirty="0">
-                        <a:latin typeface="Courier New" panose="02070309020205020404" pitchFamily="49" charset="0"/>
-                        <a:cs typeface="Courier New" panose="02070309020205020404" pitchFamily="49" charset="0"/>
-                      </a:endParaRPr>
-                    </a:p>
-                  </a:txBody>
-                  <a:tcPr anchor="ctr"/>
-                </a:tc>
-                <a:tc>
-                  <a:txBody>
-                    <a:bodyPr/>
-                    <a:lstStyle/>
-                    <a:p>
-                      <a:pPr algn="ctr"/>
-                      <a:r>
-                        <a:rPr lang="es-ES" sz="2000" dirty="0">
-                          <a:latin typeface="Courier New" panose="02070309020205020404" pitchFamily="49" charset="0"/>
-                          <a:cs typeface="Courier New" panose="02070309020205020404" pitchFamily="49" charset="0"/>
-                        </a:rPr>
-                        <a:t>e</a:t>
-                      </a:r>
-                      <a:endParaRPr lang="es-PR" sz="2000" dirty="0">
-                        <a:latin typeface="Courier New" panose="02070309020205020404" pitchFamily="49" charset="0"/>
-                        <a:cs typeface="Courier New" panose="02070309020205020404" pitchFamily="49" charset="0"/>
-                      </a:endParaRPr>
-                    </a:p>
-                  </a:txBody>
-                  <a:tcPr anchor="ctr"/>
-                </a:tc>
-                <a:tc>
-                  <a:txBody>
-                    <a:bodyPr/>
-                    <a:lstStyle/>
-                    <a:p>
-                      <a:pPr algn="ctr"/>
-                      <a:r>
-                        <a:rPr lang="es-ES" sz="2000" dirty="0">
-                          <a:latin typeface="Courier New" panose="02070309020205020404" pitchFamily="49" charset="0"/>
-                          <a:cs typeface="Courier New" panose="02070309020205020404" pitchFamily="49" charset="0"/>
-                        </a:rPr>
-                        <a:t>n</a:t>
-                      </a:r>
-                      <a:endParaRPr lang="es-PR" sz="2000" dirty="0">
-                        <a:latin typeface="Courier New" panose="02070309020205020404" pitchFamily="49" charset="0"/>
-                        <a:cs typeface="Courier New" panose="02070309020205020404" pitchFamily="49" charset="0"/>
-                      </a:endParaRPr>
-                    </a:p>
-                  </a:txBody>
-                  <a:tcPr anchor="ctr"/>
-                </a:tc>
-                <a:tc>
-                  <a:txBody>
-                    <a:bodyPr/>
-                    <a:lstStyle/>
-                    <a:p>
-                      <a:pPr algn="ctr"/>
-                      <a:r>
-                        <a:rPr lang="es-ES" sz="2000" dirty="0">
-                          <a:latin typeface="Courier New" panose="02070309020205020404" pitchFamily="49" charset="0"/>
-                          <a:cs typeface="Courier New" panose="02070309020205020404" pitchFamily="49" charset="0"/>
-                        </a:rPr>
-                        <a:t>c</a:t>
-                      </a:r>
-                      <a:endParaRPr lang="es-PR" sz="2000" dirty="0">
-                        <a:latin typeface="Courier New" panose="02070309020205020404" pitchFamily="49" charset="0"/>
-                        <a:cs typeface="Courier New" panose="02070309020205020404" pitchFamily="49" charset="0"/>
-                      </a:endParaRPr>
-                    </a:p>
-                  </a:txBody>
-                  <a:tcPr anchor="ctr"/>
-                </a:tc>
                 <a:tc>
                   <a:txBody>
                     <a:bodyPr/>
@@ -11016,10 +11009,31 @@
                       </a:pPr>
                       <a:r>
                         <a:rPr lang="es-ES" sz="2000" dirty="0">
-                          <a:latin typeface="Webdings" panose="05030102010509060703" pitchFamily="18" charset="2"/>
+                          <a:latin typeface="Courier New" panose="02070309020205020404" pitchFamily="49" charset="0"/>
                           <a:cs typeface="Courier New" panose="02070309020205020404" pitchFamily="49" charset="0"/>
                         </a:rPr>
-                        <a:t>a</a:t>
+                        <a:t>&gt;</a:t>
+                      </a:r>
+                      <a:endParaRPr lang="es-PR" sz="2000" dirty="0">
+                        <a:latin typeface="Courier New" panose="02070309020205020404" pitchFamily="49" charset="0"/>
+                        <a:cs typeface="Courier New" panose="02070309020205020404" pitchFamily="49" charset="0"/>
+                      </a:endParaRPr>
+                    </a:p>
+                  </a:txBody>
+                  <a:tcPr anchor="ctr"/>
+                </a:tc>
+                <a:tc>
+                  <a:txBody>
+                    <a:bodyPr/>
+                    <a:lstStyle/>
+                    <a:p>
+                      <a:pPr algn="ctr"/>
+                      <a:r>
+                        <a:rPr lang="es-ES" sz="2000" dirty="0">
+                          <a:latin typeface="Courier New" panose="02070309020205020404" pitchFamily="49" charset="0"/>
+                          <a:cs typeface="Courier New" panose="02070309020205020404" pitchFamily="49" charset="0"/>
+                        </a:rPr>
+                        <a:t>O</a:t>
                       </a:r>
                       <a:endParaRPr lang="es-PR" sz="2000" dirty="0">
                         <a:latin typeface="Courier New" panose="02070309020205020404" pitchFamily="49" charset="0"/>
@@ -11051,6 +11065,27 @@
                         <a:tabLst/>
                         <a:defRPr/>
                       </a:pPr>
+                      <a:r>
+                        <a:rPr lang="es-ES" sz="2000" dirty="0">
+                          <a:latin typeface="Courier New" panose="02070309020205020404" pitchFamily="49" charset="0"/>
+                          <a:cs typeface="Courier New" panose="02070309020205020404" pitchFamily="49" charset="0"/>
+                        </a:rPr>
+                        <a:t>K</a:t>
+                      </a:r>
+                      <a:endParaRPr lang="es-PR" sz="2000" dirty="0">
+                        <a:latin typeface="Courier New" panose="02070309020205020404" pitchFamily="49" charset="0"/>
+                        <a:cs typeface="Courier New" panose="02070309020205020404" pitchFamily="49" charset="0"/>
+                      </a:endParaRPr>
+                    </a:p>
+                  </a:txBody>
+                  <a:tcPr anchor="ctr"/>
+                </a:tc>
+                <a:tc>
+                  <a:txBody>
+                    <a:bodyPr/>
+                    <a:lstStyle/>
+                    <a:p>
+                      <a:pPr algn="ctr"/>
                       <a:endParaRPr lang="es-PR" sz="2000" dirty="0">
                         <a:latin typeface="Courier New" panose="02070309020205020404" pitchFamily="49" charset="0"/>
                         <a:cs typeface="Courier New" panose="02070309020205020404" pitchFamily="49" charset="0"/>
@@ -11081,71 +11116,6 @@
                         <a:tabLst/>
                         <a:defRPr/>
                       </a:pPr>
-                      <a:r>
-                        <a:rPr lang="es-ES" sz="2000" dirty="0">
-                          <a:latin typeface="Courier New" panose="02070309020205020404" pitchFamily="49" charset="0"/>
-                          <a:cs typeface="Courier New" panose="02070309020205020404" pitchFamily="49" charset="0"/>
-                        </a:rPr>
-                        <a:t>&gt;</a:t>
-                      </a:r>
-                      <a:endParaRPr lang="es-PR" sz="2000" dirty="0">
-                        <a:latin typeface="Courier New" panose="02070309020205020404" pitchFamily="49" charset="0"/>
-                        <a:cs typeface="Courier New" panose="02070309020205020404" pitchFamily="49" charset="0"/>
-                      </a:endParaRPr>
-                    </a:p>
-                  </a:txBody>
-                  <a:tcPr anchor="ctr"/>
-                </a:tc>
-                <a:tc>
-                  <a:txBody>
-                    <a:bodyPr/>
-                    <a:lstStyle/>
-                    <a:p>
-                      <a:pPr algn="ctr"/>
-                      <a:r>
-                        <a:rPr lang="es-ES" sz="2000" dirty="0">
-                          <a:latin typeface="Courier New" panose="02070309020205020404" pitchFamily="49" charset="0"/>
-                          <a:cs typeface="Courier New" panose="02070309020205020404" pitchFamily="49" charset="0"/>
-                        </a:rPr>
-                        <a:t>O</a:t>
-                      </a:r>
-                      <a:endParaRPr lang="es-PR" sz="2000" dirty="0">
-                        <a:latin typeface="Courier New" panose="02070309020205020404" pitchFamily="49" charset="0"/>
-                        <a:cs typeface="Courier New" panose="02070309020205020404" pitchFamily="49" charset="0"/>
-                      </a:endParaRPr>
-                    </a:p>
-                  </a:txBody>
-                  <a:tcPr anchor="ctr"/>
-                </a:tc>
-                <a:tc>
-                  <a:txBody>
-                    <a:bodyPr/>
-                    <a:lstStyle/>
-                    <a:p>
-                      <a:pPr marL="0" marR="0" lvl="0" indent="0" algn="ctr" defTabSz="914400" rtl="0" eaLnBrk="1" fontAlgn="auto" latinLnBrk="0" hangingPunct="1">
-                        <a:lnSpc>
-                          <a:spcPct val="100000"/>
-                        </a:lnSpc>
-                        <a:spcBef>
-                          <a:spcPts val="0"/>
-                        </a:spcBef>
-                        <a:spcAft>
-                          <a:spcPts val="0"/>
-                        </a:spcAft>
-                        <a:buClrTx/>
-                        <a:buSzTx/>
-                        <a:buFontTx/>
-                        <a:buNone/>
-                        <a:tabLst/>
-                        <a:defRPr/>
-                      </a:pPr>
-                      <a:r>
-                        <a:rPr lang="es-ES" sz="2000" dirty="0">
-                          <a:latin typeface="Courier New" panose="02070309020205020404" pitchFamily="49" charset="0"/>
-                          <a:cs typeface="Courier New" panose="02070309020205020404" pitchFamily="49" charset="0"/>
-                        </a:rPr>
-                        <a:t>K</a:t>
-                      </a:r>
                       <a:endParaRPr lang="es-PR" sz="2000" dirty="0">
                         <a:latin typeface="Courier New" panose="02070309020205020404" pitchFamily="49" charset="0"/>
                         <a:cs typeface="Courier New" panose="02070309020205020404" pitchFamily="49" charset="0"/>
@@ -20457,7 +20427,7 @@
           <p:nvPr>
             <p:extLst>
               <p:ext uri="{D42A27DB-BD31-4B8C-83A1-F6EECF244321}">
-                <p14:modId xmlns:p14="http://schemas.microsoft.com/office/powerpoint/2010/main" val="3711057605"/>
+                <p14:modId xmlns:p14="http://schemas.microsoft.com/office/powerpoint/2010/main" val="896392626"/>
               </p:ext>
             </p:extLst>
           </p:nvPr>
@@ -20619,7 +20589,28 @@
                           <a:latin typeface="Courier New" panose="02070309020205020404" pitchFamily="49" charset="0"/>
                           <a:cs typeface="Courier New" panose="02070309020205020404" pitchFamily="49" charset="0"/>
                         </a:rPr>
-                        <a:t>E</a:t>
+                        <a:t>Z</a:t>
+                      </a:r>
+                      <a:endParaRPr lang="es-PR" sz="2000" dirty="0">
+                        <a:latin typeface="Courier New" panose="02070309020205020404" pitchFamily="49" charset="0"/>
+                        <a:cs typeface="Courier New" panose="02070309020205020404" pitchFamily="49" charset="0"/>
+                      </a:endParaRPr>
+                    </a:p>
+                  </a:txBody>
+                  <a:tcPr anchor="ctr"/>
+                </a:tc>
+                <a:tc>
+                  <a:txBody>
+                    <a:bodyPr/>
+                    <a:lstStyle/>
+                    <a:p>
+                      <a:pPr algn="ctr"/>
+                      <a:r>
+                        <a:rPr lang="es-ES" sz="2000" dirty="0">
+                          <a:latin typeface="Courier New" panose="02070309020205020404" pitchFamily="49" charset="0"/>
+                          <a:cs typeface="Courier New" panose="02070309020205020404" pitchFamily="49" charset="0"/>
+                        </a:rPr>
+                        <a:t>o</a:t>
                       </a:r>
                       <a:endParaRPr lang="es-PR" sz="2000" dirty="0">
                         <a:latin typeface="Courier New" panose="02070309020205020404" pitchFamily="49" charset="0"/>
@@ -20661,8 +20652,22 @@
                           <a:latin typeface="Courier New" panose="02070309020205020404" pitchFamily="49" charset="0"/>
                           <a:cs typeface="Courier New" panose="02070309020205020404" pitchFamily="49" charset="0"/>
                         </a:rPr>
-                        <a:t>G</a:t>
-                      </a:r>
+                        <a:t>e</a:t>
+                      </a:r>
+                      <a:endParaRPr lang="es-PR" sz="2000" dirty="0">
+                        <a:latin typeface="Courier New" panose="02070309020205020404" pitchFamily="49" charset="0"/>
+                        <a:cs typeface="Courier New" panose="02070309020205020404" pitchFamily="49" charset="0"/>
+                      </a:endParaRPr>
+                    </a:p>
+                  </a:txBody>
+                  <a:tcPr anchor="ctr"/>
+                </a:tc>
+                <a:tc>
+                  <a:txBody>
+                    <a:bodyPr/>
+                    <a:lstStyle/>
+                    <a:p>
+                      <a:pPr algn="ctr"/>
                       <a:endParaRPr lang="es-PR" sz="2000" dirty="0">
                         <a:latin typeface="Courier New" panose="02070309020205020404" pitchFamily="49" charset="0"/>
                         <a:cs typeface="Courier New" panose="02070309020205020404" pitchFamily="49" charset="0"/>
@@ -20682,7 +20687,63 @@
                           <a:latin typeface="Courier New" panose="02070309020205020404" pitchFamily="49" charset="0"/>
                           <a:cs typeface="Courier New" panose="02070309020205020404" pitchFamily="49" charset="0"/>
                         </a:rPr>
-                        <a:t>l</a:t>
+                        <a:t>1</a:t>
+                      </a:r>
+                      <a:endParaRPr lang="es-PR" sz="2000" dirty="0">
+                        <a:latin typeface="Courier New" panose="02070309020205020404" pitchFamily="49" charset="0"/>
+                        <a:cs typeface="Courier New" panose="02070309020205020404" pitchFamily="49" charset="0"/>
+                      </a:endParaRPr>
+                    </a:p>
+                  </a:txBody>
+                  <a:tcPr anchor="ctr"/>
+                </a:tc>
+                <a:tc>
+                  <a:txBody>
+                    <a:bodyPr/>
+                    <a:lstStyle/>
+                    <a:p>
+                      <a:pPr algn="ctr"/>
+                      <a:endParaRPr lang="es-PR" sz="2000" dirty="0">
+                        <a:latin typeface="Webdings" panose="05030102010509060703" pitchFamily="18" charset="2"/>
+                        <a:cs typeface="Courier New" panose="02070309020205020404" pitchFamily="49" charset="0"/>
+                      </a:endParaRPr>
+                    </a:p>
+                  </a:txBody>
+                  <a:tcPr anchor="ctr"/>
+                </a:tc>
+                <a:tc>
+                  <a:txBody>
+                    <a:bodyPr/>
+                    <a:lstStyle/>
+                    <a:p>
+                      <a:pPr algn="ctr"/>
+                      <a:r>
+                        <a:rPr lang="es-ES" sz="2000" dirty="0">
+                          <a:latin typeface="Courier New" panose="02070309020205020404" pitchFamily="49" charset="0"/>
+                          <a:cs typeface="Courier New" panose="02070309020205020404" pitchFamily="49" charset="0"/>
+                        </a:rPr>
+                        <a:t>&gt;</a:t>
+                      </a:r>
+                      <a:endParaRPr lang="es-PR" sz="2000" dirty="0">
+                        <a:latin typeface="Courier New" panose="02070309020205020404" pitchFamily="49" charset="0"/>
+                        <a:cs typeface="Courier New" panose="02070309020205020404" pitchFamily="49" charset="0"/>
+                      </a:endParaRPr>
+                    </a:p>
+                  </a:txBody>
+                  <a:tcPr anchor="ctr"/>
+                </a:tc>
+                <a:tc>
+                  <a:txBody>
+                    <a:bodyPr/>
+                    <a:lstStyle/>
+                    <a:p>
+                      <a:pPr algn="ctr"/>
+                      <a:r>
+                        <a:rPr lang="es-ES" sz="2000" dirty="0">
+                          <a:latin typeface="Courier New" panose="02070309020205020404" pitchFamily="49" charset="0"/>
+                          <a:cs typeface="Courier New" panose="02070309020205020404" pitchFamily="49" charset="0"/>
+                        </a:rPr>
+                        <a:t>Z</a:t>
                       </a:r>
                       <a:endParaRPr lang="es-PR" sz="2000" dirty="0">
                         <a:latin typeface="Courier New" panose="02070309020205020404" pitchFamily="49" charset="0"/>
@@ -20724,111 +20785,6 @@
                           <a:latin typeface="Courier New" panose="02070309020205020404" pitchFamily="49" charset="0"/>
                           <a:cs typeface="Courier New" panose="02070309020205020404" pitchFamily="49" charset="0"/>
                         </a:rPr>
-                        <a:t>b</a:t>
-                      </a:r>
-                      <a:endParaRPr lang="es-PR" sz="2000" dirty="0">
-                        <a:latin typeface="Courier New" panose="02070309020205020404" pitchFamily="49" charset="0"/>
-                        <a:cs typeface="Courier New" panose="02070309020205020404" pitchFamily="49" charset="0"/>
-                      </a:endParaRPr>
-                    </a:p>
-                  </a:txBody>
-                  <a:tcPr anchor="ctr"/>
-                </a:tc>
-                <a:tc>
-                  <a:txBody>
-                    <a:bodyPr/>
-                    <a:lstStyle/>
-                    <a:p>
-                      <a:pPr algn="ctr"/>
-                      <a:r>
-                        <a:rPr lang="es-ES" sz="2000" dirty="0">
-                          <a:latin typeface="Webdings" panose="05030102010509060703" pitchFamily="18" charset="2"/>
-                          <a:cs typeface="Courier New" panose="02070309020205020404" pitchFamily="49" charset="0"/>
-                        </a:rPr>
-                        <a:t>a</a:t>
-                      </a:r>
-                      <a:endParaRPr lang="es-PR" sz="2000" dirty="0">
-                        <a:latin typeface="Webdings" panose="05030102010509060703" pitchFamily="18" charset="2"/>
-                        <a:cs typeface="Courier New" panose="02070309020205020404" pitchFamily="49" charset="0"/>
-                      </a:endParaRPr>
-                    </a:p>
-                  </a:txBody>
-                  <a:tcPr anchor="ctr"/>
-                </a:tc>
-                <a:tc>
-                  <a:txBody>
-                    <a:bodyPr/>
-                    <a:lstStyle/>
-                    <a:p>
-                      <a:pPr algn="ctr"/>
-                      <a:r>
-                        <a:rPr lang="es-ES" sz="2000" dirty="0">
-                          <a:latin typeface="Courier New" panose="02070309020205020404" pitchFamily="49" charset="0"/>
-                          <a:cs typeface="Courier New" panose="02070309020205020404" pitchFamily="49" charset="0"/>
-                        </a:rPr>
-                        <a:t>&gt;</a:t>
-                      </a:r>
-                      <a:endParaRPr lang="es-PR" sz="2000" dirty="0">
-                        <a:latin typeface="Courier New" panose="02070309020205020404" pitchFamily="49" charset="0"/>
-                        <a:cs typeface="Courier New" panose="02070309020205020404" pitchFamily="49" charset="0"/>
-                      </a:endParaRPr>
-                    </a:p>
-                  </a:txBody>
-                  <a:tcPr anchor="ctr"/>
-                </a:tc>
-                <a:tc>
-                  <a:txBody>
-                    <a:bodyPr/>
-                    <a:lstStyle/>
-                    <a:p>
-                      <a:pPr algn="ctr"/>
-                      <a:r>
-                        <a:rPr lang="es-ES" sz="2000" dirty="0">
-                          <a:latin typeface="Courier New" panose="02070309020205020404" pitchFamily="49" charset="0"/>
-                          <a:cs typeface="Courier New" panose="02070309020205020404" pitchFamily="49" charset="0"/>
-                        </a:rPr>
-                        <a:t>Z</a:t>
-                      </a:r>
-                      <a:endParaRPr lang="es-PR" sz="2000" dirty="0">
-                        <a:latin typeface="Courier New" panose="02070309020205020404" pitchFamily="49" charset="0"/>
-                        <a:cs typeface="Courier New" panose="02070309020205020404" pitchFamily="49" charset="0"/>
-                      </a:endParaRPr>
-                    </a:p>
-                  </a:txBody>
-                  <a:tcPr anchor="ctr"/>
-                </a:tc>
-                <a:tc>
-                  <a:txBody>
-                    <a:bodyPr/>
-                    <a:lstStyle/>
-                    <a:p>
-                      <a:pPr algn="ctr"/>
-                      <a:r>
-                        <a:rPr lang="es-ES" sz="2000" dirty="0">
-                          <a:latin typeface="Courier New" panose="02070309020205020404" pitchFamily="49" charset="0"/>
-                          <a:cs typeface="Courier New" panose="02070309020205020404" pitchFamily="49" charset="0"/>
-                        </a:rPr>
-                        <a:t>o</a:t>
-                      </a:r>
-                      <a:endParaRPr lang="es-PR" sz="2000" dirty="0">
-                        <a:latin typeface="Courier New" panose="02070309020205020404" pitchFamily="49" charset="0"/>
-                        <a:cs typeface="Courier New" panose="02070309020205020404" pitchFamily="49" charset="0"/>
-                      </a:endParaRPr>
-                    </a:p>
-                  </a:txBody>
-                  <a:tcPr anchor="ctr"/>
-                </a:tc>
-                <a:tc>
-                  <a:txBody>
-                    <a:bodyPr/>
-                    <a:lstStyle/>
-                    <a:p>
-                      <a:pPr algn="ctr"/>
-                      <a:r>
-                        <a:rPr lang="es-ES" sz="2000" dirty="0">
-                          <a:latin typeface="Courier New" panose="02070309020205020404" pitchFamily="49" charset="0"/>
-                          <a:cs typeface="Courier New" panose="02070309020205020404" pitchFamily="49" charset="0"/>
-                        </a:rPr>
                         <a:t>n</a:t>
                       </a:r>
                       <a:endParaRPr lang="es-PR" sz="2000" dirty="0">
@@ -20885,7 +20841,7 @@
                           <a:latin typeface="Courier New" panose="02070309020205020404" pitchFamily="49" charset="0"/>
                           <a:cs typeface="Courier New" panose="02070309020205020404" pitchFamily="49" charset="0"/>
                         </a:rPr>
-                        <a:t>1</a:t>
+                        <a:t>2</a:t>
                       </a:r>
                       <a:endParaRPr lang="es-PR" sz="2000" dirty="0">
                         <a:latin typeface="Courier New" panose="02070309020205020404" pitchFamily="49" charset="0"/>
@@ -20948,7 +20904,70 @@
                           <a:latin typeface="Courier New" panose="02070309020205020404" pitchFamily="49" charset="0"/>
                           <a:cs typeface="Courier New" panose="02070309020205020404" pitchFamily="49" charset="0"/>
                         </a:rPr>
-                        <a:t>Z</a:t>
+                        <a:t>E</a:t>
+                      </a:r>
+                      <a:endParaRPr lang="es-PR" sz="2000" dirty="0">
+                        <a:latin typeface="Courier New" panose="02070309020205020404" pitchFamily="49" charset="0"/>
+                        <a:cs typeface="Courier New" panose="02070309020205020404" pitchFamily="49" charset="0"/>
+                      </a:endParaRPr>
+                    </a:p>
+                  </a:txBody>
+                  <a:tcPr anchor="ctr"/>
+                </a:tc>
+                <a:tc>
+                  <a:txBody>
+                    <a:bodyPr/>
+                    <a:lstStyle/>
+                    <a:p>
+                      <a:pPr algn="ctr"/>
+                      <a:r>
+                        <a:rPr lang="es-ES" sz="2000" dirty="0">
+                          <a:latin typeface="Courier New" panose="02070309020205020404" pitchFamily="49" charset="0"/>
+                          <a:cs typeface="Courier New" panose="02070309020205020404" pitchFamily="49" charset="0"/>
+                        </a:rPr>
+                        <a:t>n</a:t>
+                      </a:r>
+                      <a:endParaRPr lang="es-PR" sz="2000" dirty="0">
+                        <a:latin typeface="Courier New" panose="02070309020205020404" pitchFamily="49" charset="0"/>
+                        <a:cs typeface="Courier New" panose="02070309020205020404" pitchFamily="49" charset="0"/>
+                      </a:endParaRPr>
+                    </a:p>
+                  </a:txBody>
+                  <a:tcPr anchor="ctr"/>
+                </a:tc>
+                <a:tc>
+                  <a:txBody>
+                    <a:bodyPr/>
+                    <a:lstStyle/>
+                    <a:p>
+                      <a:pPr algn="ctr"/>
+                      <a:r>
+                        <a:rPr lang="es-ES" sz="2000" dirty="0">
+                          <a:latin typeface="Courier New" panose="02070309020205020404" pitchFamily="49" charset="0"/>
+                          <a:cs typeface="Courier New" panose="02070309020205020404" pitchFamily="49" charset="0"/>
+                        </a:rPr>
+                        <a:t>G</a:t>
+                      </a:r>
+                      <a:endParaRPr lang="es-PR" sz="2000" dirty="0">
+                        <a:latin typeface="Courier New" panose="02070309020205020404" pitchFamily="49" charset="0"/>
+                        <a:cs typeface="Courier New" panose="02070309020205020404" pitchFamily="49" charset="0"/>
+                      </a:endParaRPr>
+                    </a:p>
+                  </a:txBody>
+                  <a:tcPr anchor="ctr"/>
+                </a:tc>
+                <a:tc>
+                  <a:txBody>
+                    <a:bodyPr/>
+                    <a:lstStyle/>
+                    <a:p>
+                      <a:pPr algn="ctr"/>
+                      <a:r>
+                        <a:rPr lang="es-ES" sz="2000" dirty="0">
+                          <a:latin typeface="Courier New" panose="02070309020205020404" pitchFamily="49" charset="0"/>
+                          <a:cs typeface="Courier New" panose="02070309020205020404" pitchFamily="49" charset="0"/>
+                        </a:rPr>
+                        <a:t>l</a:t>
                       </a:r>
                       <a:endParaRPr lang="es-PR" sz="2000" dirty="0">
                         <a:latin typeface="Courier New" panose="02070309020205020404" pitchFamily="49" charset="0"/>
@@ -20990,7 +21009,7 @@
                           <a:latin typeface="Courier New" panose="02070309020205020404" pitchFamily="49" charset="0"/>
                           <a:cs typeface="Courier New" panose="02070309020205020404" pitchFamily="49" charset="0"/>
                         </a:rPr>
-                        <a:t>n</a:t>
+                        <a:t>b</a:t>
                       </a:r>
                       <a:endParaRPr lang="es-PR" sz="2000" dirty="0">
                         <a:latin typeface="Courier New" panose="02070309020205020404" pitchFamily="49" charset="0"/>
@@ -21008,62 +21027,13 @@
                       <a:pPr algn="ctr"/>
                       <a:r>
                         <a:rPr lang="es-ES" sz="2000" dirty="0">
-                          <a:latin typeface="Courier New" panose="02070309020205020404" pitchFamily="49" charset="0"/>
+                          <a:latin typeface="Webdings" panose="05030102010509060703" pitchFamily="18" charset="2"/>
                           <a:cs typeface="Courier New" panose="02070309020205020404" pitchFamily="49" charset="0"/>
                         </a:rPr>
-                        <a:t>e</a:t>
-                      </a:r>
-                      <a:endParaRPr lang="es-PR" sz="2000" dirty="0">
-                        <a:latin typeface="Courier New" panose="02070309020205020404" pitchFamily="49" charset="0"/>
-                        <a:cs typeface="Courier New" panose="02070309020205020404" pitchFamily="49" charset="0"/>
-                      </a:endParaRPr>
-                    </a:p>
-                  </a:txBody>
-                  <a:tcPr anchor="ctr"/>
-                </a:tc>
-                <a:tc>
-                  <a:txBody>
-                    <a:bodyPr/>
-                    <a:lstStyle/>
-                    <a:p>
-                      <a:pPr algn="ctr"/>
-                      <a:endParaRPr lang="es-PR" sz="2000" dirty="0">
-                        <a:latin typeface="Courier New" panose="02070309020205020404" pitchFamily="49" charset="0"/>
-                        <a:cs typeface="Courier New" panose="02070309020205020404" pitchFamily="49" charset="0"/>
-                      </a:endParaRPr>
-                    </a:p>
-                  </a:txBody>
-                  <a:tcPr anchor="ctr"/>
-                </a:tc>
-                <a:tc>
-                  <a:txBody>
-                    <a:bodyPr/>
-                    <a:lstStyle/>
-                    <a:p>
-                      <a:pPr algn="ctr"/>
-                      <a:r>
-                        <a:rPr lang="es-ES" sz="2000" dirty="0">
-                          <a:latin typeface="Courier New" panose="02070309020205020404" pitchFamily="49" charset="0"/>
-                          <a:cs typeface="Courier New" panose="02070309020205020404" pitchFamily="49" charset="0"/>
-                        </a:rPr>
-                        <a:t>2</a:t>
-                      </a:r>
-                      <a:endParaRPr lang="es-PR" sz="2000" dirty="0">
-                        <a:latin typeface="Courier New" panose="02070309020205020404" pitchFamily="49" charset="0"/>
-                        <a:cs typeface="Courier New" panose="02070309020205020404" pitchFamily="49" charset="0"/>
-                      </a:endParaRPr>
-                    </a:p>
-                  </a:txBody>
-                  <a:tcPr anchor="ctr"/>
-                </a:tc>
-                <a:tc>
-                  <a:txBody>
-                    <a:bodyPr/>
-                    <a:lstStyle/>
-                    <a:p>
-                      <a:pPr algn="ctr"/>
-                      <a:endParaRPr lang="es-PR" sz="2000" dirty="0">
-                        <a:latin typeface="Courier New" panose="02070309020205020404" pitchFamily="49" charset="0"/>
+                        <a:t>a</a:t>
+                      </a:r>
+                      <a:endParaRPr lang="es-PR" sz="2000" dirty="0">
+                        <a:latin typeface="Webdings" panose="05030102010509060703" pitchFamily="18" charset="2"/>
                         <a:cs typeface="Courier New" panose="02070309020205020404" pitchFamily="49" charset="0"/>
                       </a:endParaRPr>
                     </a:p>
@@ -21268,7 +21238,7 @@
           <a:p>
             <a:r>
               <a:rPr lang="es-ES" dirty="0"/>
-              <a:t>Menú de alarmas</a:t>
+              <a:t>Menú de configuración de alarmas</a:t>
             </a:r>
             <a:endParaRPr lang="es-PR" dirty="0"/>
           </a:p>

</xml_diff>